<commit_message>
realized I failed in epic proportion. Redoing entire project
</commit_message>
<xml_diff>
--- a/project ver.2/Presentation.pptx
+++ b/project ver.2/Presentation.pptx
@@ -6,12 +6,14 @@
   </p:sldMasterIdLst>
   <p:sldIdLst>
     <p:sldId id="256" r:id="rId2"/>
-    <p:sldId id="262" r:id="rId3"/>
+    <p:sldId id="264" r:id="rId3"/>
     <p:sldId id="261" r:id="rId4"/>
-    <p:sldId id="263" r:id="rId5"/>
-    <p:sldId id="258" r:id="rId6"/>
-    <p:sldId id="257" r:id="rId7"/>
-    <p:sldId id="260" r:id="rId8"/>
+    <p:sldId id="262" r:id="rId5"/>
+    <p:sldId id="265" r:id="rId6"/>
+    <p:sldId id="263" r:id="rId7"/>
+    <p:sldId id="258" r:id="rId8"/>
+    <p:sldId id="257" r:id="rId9"/>
+    <p:sldId id="260" r:id="rId10"/>
   </p:sldIdLst>
   <p:sldSz cx="9144000" cy="6858000" type="screen4x3"/>
   <p:notesSz cx="6858000" cy="9144000"/>
@@ -549,7 +551,7 @@
           <a:p>
             <a:fld id="{910B1486-F9C6-254C-8CD1-F05824E216D5}" type="datetimeFigureOut">
               <a:rPr lang="en-US" smtClean="0"/>
-              <a:t>07/03/17</a:t>
+              <a:t>08/03/17</a:t>
             </a:fld>
             <a:endParaRPr lang="en-US"/>
           </a:p>
@@ -1161,7 +1163,7 @@
           <a:p>
             <a:fld id="{910B1486-F9C6-254C-8CD1-F05824E216D5}" type="datetimeFigureOut">
               <a:rPr lang="en-US" smtClean="0"/>
-              <a:t>07/03/17</a:t>
+              <a:t>08/03/17</a:t>
             </a:fld>
             <a:endParaRPr lang="en-US"/>
           </a:p>
@@ -1733,7 +1735,7 @@
           <a:p>
             <a:fld id="{910B1486-F9C6-254C-8CD1-F05824E216D5}" type="datetimeFigureOut">
               <a:rPr lang="en-US" smtClean="0"/>
-              <a:t>07/03/17</a:t>
+              <a:t>08/03/17</a:t>
             </a:fld>
             <a:endParaRPr lang="en-US"/>
           </a:p>
@@ -2267,7 +2269,7 @@
           <a:p>
             <a:fld id="{910B1486-F9C6-254C-8CD1-F05824E216D5}" type="datetimeFigureOut">
               <a:rPr lang="en-US" smtClean="0"/>
-              <a:t>07/03/17</a:t>
+              <a:t>08/03/17</a:t>
             </a:fld>
             <a:endParaRPr lang="en-US"/>
           </a:p>
@@ -2669,7 +2671,7 @@
           <a:p>
             <a:fld id="{910B1486-F9C6-254C-8CD1-F05824E216D5}" type="datetimeFigureOut">
               <a:rPr lang="en-US" smtClean="0"/>
-              <a:t>07/03/17</a:t>
+              <a:t>08/03/17</a:t>
             </a:fld>
             <a:endParaRPr lang="en-US"/>
           </a:p>
@@ -3102,7 +3104,7 @@
           <a:p>
             <a:fld id="{910B1486-F9C6-254C-8CD1-F05824E216D5}" type="datetimeFigureOut">
               <a:rPr lang="en-US" smtClean="0"/>
-              <a:t>07/03/17</a:t>
+              <a:t>08/03/17</a:t>
             </a:fld>
             <a:endParaRPr lang="en-US"/>
           </a:p>
@@ -3504,7 +3506,7 @@
           <a:p>
             <a:fld id="{910B1486-F9C6-254C-8CD1-F05824E216D5}" type="datetimeFigureOut">
               <a:rPr lang="en-US" smtClean="0"/>
-              <a:t>07/03/17</a:t>
+              <a:t>08/03/17</a:t>
             </a:fld>
             <a:endParaRPr lang="en-US"/>
           </a:p>
@@ -3978,7 +3980,7 @@
           <a:p>
             <a:fld id="{910B1486-F9C6-254C-8CD1-F05824E216D5}" type="datetimeFigureOut">
               <a:rPr lang="en-US" smtClean="0"/>
-              <a:t>07/03/17</a:t>
+              <a:t>08/03/17</a:t>
             </a:fld>
             <a:endParaRPr lang="en-US"/>
           </a:p>
@@ -4428,7 +4430,7 @@
           <a:p>
             <a:fld id="{910B1486-F9C6-254C-8CD1-F05824E216D5}" type="datetimeFigureOut">
               <a:rPr lang="en-US" smtClean="0"/>
-              <a:t>07/03/17</a:t>
+              <a:t>08/03/17</a:t>
             </a:fld>
             <a:endParaRPr lang="en-US"/>
           </a:p>
@@ -4948,7 +4950,7 @@
           <a:p>
             <a:fld id="{910B1486-F9C6-254C-8CD1-F05824E216D5}" type="datetimeFigureOut">
               <a:rPr lang="en-US" smtClean="0"/>
-              <a:t>07/03/17</a:t>
+              <a:t>08/03/17</a:t>
             </a:fld>
             <a:endParaRPr lang="en-US"/>
           </a:p>
@@ -5668,7 +5670,7 @@
           <a:p>
             <a:fld id="{910B1486-F9C6-254C-8CD1-F05824E216D5}" type="datetimeFigureOut">
               <a:rPr lang="en-US" smtClean="0"/>
-              <a:t>07/03/17</a:t>
+              <a:t>08/03/17</a:t>
             </a:fld>
             <a:endParaRPr lang="en-US"/>
           </a:p>
@@ -6014,7 +6016,7 @@
           <a:p>
             <a:fld id="{910B1486-F9C6-254C-8CD1-F05824E216D5}" type="datetimeFigureOut">
               <a:rPr lang="en-US" smtClean="0"/>
-              <a:t>07/03/17</a:t>
+              <a:t>08/03/17</a:t>
             </a:fld>
             <a:endParaRPr lang="en-US"/>
           </a:p>
@@ -6283,7 +6285,7 @@
           <a:p>
             <a:fld id="{910B1486-F9C6-254C-8CD1-F05824E216D5}" type="datetimeFigureOut">
               <a:rPr lang="en-US" smtClean="0"/>
-              <a:t>07/03/17</a:t>
+              <a:t>08/03/17</a:t>
             </a:fld>
             <a:endParaRPr lang="en-US"/>
           </a:p>
@@ -6840,7 +6842,7 @@
           <a:p>
             <a:fld id="{910B1486-F9C6-254C-8CD1-F05824E216D5}" type="datetimeFigureOut">
               <a:rPr lang="en-US" smtClean="0"/>
-              <a:t>07/03/17</a:t>
+              <a:t>08/03/17</a:t>
             </a:fld>
             <a:endParaRPr lang="en-US"/>
           </a:p>
@@ -7051,7 +7053,7 @@
           <a:p>
             <a:fld id="{910B1486-F9C6-254C-8CD1-F05824E216D5}" type="datetimeFigureOut">
               <a:rPr lang="en-US" smtClean="0"/>
-              <a:t>07/03/17</a:t>
+              <a:t>08/03/17</a:t>
             </a:fld>
             <a:endParaRPr lang="en-US"/>
           </a:p>
@@ -7533,7 +7535,7 @@
           <a:p>
             <a:r>
               <a:rPr lang="en-US" sz="4000" dirty="0" smtClean="0"/>
-              <a:t>Reducing and Adjusting for Non-Response Bias</a:t>
+              <a:t>Surveying Methods and Non-Response Bias</a:t>
             </a:r>
             <a:endParaRPr lang="en-US" sz="4000" dirty="0"/>
           </a:p>
@@ -7628,15 +7630,15 @@
         <p:spPr/>
         <p:txBody>
           <a:bodyPr>
-            <a:normAutofit/>
+            <a:normAutofit fontScale="90000"/>
           </a:bodyPr>
           <a:lstStyle/>
           <a:p>
             <a:r>
-              <a:rPr lang="en-US" sz="3500" dirty="0" smtClean="0"/>
-              <a:t>What is Non-Response Bias?</a:t>
-            </a:r>
-            <a:endParaRPr lang="en-US" sz="3500" dirty="0"/>
+              <a:rPr lang="en-US" dirty="0" smtClean="0"/>
+              <a:t>Random and convenient sampling</a:t>
+            </a:r>
+            <a:endParaRPr lang="en-US" dirty="0"/>
           </a:p>
         </p:txBody>
       </p:sp>
@@ -7652,34 +7654,19 @@
         </p:nvSpPr>
         <p:spPr>
           <a:xfrm>
-            <a:off x="900113" y="2133601"/>
-            <a:ext cx="6894148" cy="1981787"/>
+            <a:off x="900112" y="2133601"/>
+            <a:ext cx="7930808" cy="1852446"/>
           </a:xfrm>
         </p:spPr>
         <p:txBody>
           <a:bodyPr>
-            <a:normAutofit/>
+            <a:normAutofit fontScale="92500" lnSpcReduction="20000"/>
           </a:bodyPr>
           <a:lstStyle/>
           <a:p>
             <a:r>
-              <a:rPr lang="en-US" dirty="0"/>
-              <a:t>E</a:t>
-            </a:r>
-            <a:r>
               <a:rPr lang="en-US" dirty="0" smtClean="0"/>
-              <a:t>rror due particular population not responding to </a:t>
-            </a:r>
-            <a:r>
-              <a:rPr lang="en-US" dirty="0" smtClean="0"/>
-              <a:t>poll. 2 kinds:</a:t>
-            </a:r>
-          </a:p>
-          <a:p>
-            <a:pPr lvl="1"/>
-            <a:r>
-              <a:rPr lang="en-US" dirty="0" smtClean="0"/>
-              <a:t>Unit non-response </a:t>
+              <a:t>Random </a:t>
             </a:r>
             <a:r>
               <a:rPr lang="mr-IN" dirty="0" smtClean="0"/>
@@ -7687,14 +7674,16 @@
             </a:r>
             <a:r>
               <a:rPr lang="en-US" dirty="0" smtClean="0"/>
-              <a:t> refuses to take survey</a:t>
-            </a:r>
-          </a:p>
-          <a:p>
-            <a:pPr lvl="1"/>
+              <a:t> survey a sub-population selected at random</a:t>
+            </a:r>
+          </a:p>
+          <a:p>
+            <a:endParaRPr lang="en-US" dirty="0"/>
+          </a:p>
+          <a:p>
             <a:r>
               <a:rPr lang="en-US" dirty="0" smtClean="0"/>
-              <a:t>Item non-response </a:t>
+              <a:t>Convenient </a:t>
             </a:r>
             <a:r>
               <a:rPr lang="mr-IN" dirty="0" smtClean="0"/>
@@ -7702,41 +7691,14 @@
             </a:r>
             <a:r>
               <a:rPr lang="en-US" dirty="0" smtClean="0"/>
-              <a:t> 1 question empty</a:t>
-            </a:r>
-            <a:endParaRPr lang="en-US" dirty="0" smtClean="0"/>
-          </a:p>
-        </p:txBody>
-      </p:sp>
-      <p:sp>
-        <p:nvSpPr>
-          <p:cNvPr id="6" name="TextBox 5"/>
-          <p:cNvSpPr txBox="1"/>
-          <p:nvPr/>
-        </p:nvSpPr>
-        <p:spPr>
-          <a:xfrm>
-            <a:off x="2128357" y="5255938"/>
-            <a:ext cx="2178301" cy="369332"/>
-          </a:xfrm>
-          <a:prstGeom prst="rect">
-            <a:avLst/>
-          </a:prstGeom>
-          <a:noFill/>
-        </p:spPr>
-        <p:txBody>
-          <a:bodyPr wrap="none" rtlCol="0">
-            <a:spAutoFit/>
-          </a:bodyPr>
-          <a:lstStyle/>
-          <a:p>
+              <a:t> sample people who are easy to reach</a:t>
+            </a:r>
+          </a:p>
+          <a:p>
+            <a:pPr lvl="1"/>
             <a:r>
               <a:rPr lang="en-US" dirty="0" smtClean="0"/>
-              <a:t>N_T = N_R </a:t>
-            </a:r>
-            <a:r>
-              <a:rPr lang="en-US" smtClean="0"/>
-              <a:t>+ N_M</a:t>
+              <a:t>E.g. volunteer sampling</a:t>
             </a:r>
             <a:endParaRPr lang="en-US" dirty="0"/>
           </a:p>
@@ -7745,20 +7707,13 @@
     </p:spTree>
     <p:extLst>
       <p:ext uri="{BB962C8B-B14F-4D97-AF65-F5344CB8AC3E}">
-        <p14:creationId xmlns:p14="http://schemas.microsoft.com/office/powerpoint/2010/main" val="1277114888"/>
+        <p14:creationId xmlns:p14="http://schemas.microsoft.com/office/powerpoint/2010/main" val="2051937309"/>
       </p:ext>
     </p:extLst>
   </p:cSld>
   <p:clrMapOvr>
     <a:masterClrMapping/>
   </p:clrMapOvr>
-  <p:timing>
-    <p:tnLst>
-      <p:par>
-        <p:cTn xmlns:p14="http://schemas.microsoft.com/office/powerpoint/2010/main" id="1" dur="indefinite" restart="never" nodeType="tmRoot"/>
-      </p:par>
-    </p:tnLst>
-  </p:timing>
 </p:sld>
 </file>
 
@@ -7798,7 +7753,7 @@
           <a:p>
             <a:r>
               <a:rPr lang="en-US" sz="4000" dirty="0" smtClean="0"/>
-              <a:t>Surveying is trash in </a:t>
+              <a:t>Data analysis: trash in </a:t>
             </a:r>
             <a:r>
               <a:rPr lang="en-US" sz="4000" dirty="0"/>
@@ -7860,13 +7815,8 @@
             </a:r>
             <a:r>
               <a:rPr lang="en-US" dirty="0" smtClean="0"/>
-              <a:t> is as important as analyzing them!</a:t>
-            </a:r>
-            <a:r>
-              <a:rPr lang="en-US" dirty="0" smtClean="0"/>
-              <a:t>!</a:t>
-            </a:r>
-            <a:endParaRPr lang="en-US" dirty="0" smtClean="0"/>
+              <a:t> is as important as analyzing them!!</a:t>
+            </a:r>
           </a:p>
         </p:txBody>
       </p:sp>
@@ -8166,6 +8116,51 @@
           </a:prstGeom>
         </p:spPr>
       </p:pic>
+      <p:sp>
+        <p:nvSpPr>
+          <p:cNvPr id="4" name="TextBox 3"/>
+          <p:cNvSpPr txBox="1"/>
+          <p:nvPr/>
+        </p:nvSpPr>
+        <p:spPr>
+          <a:xfrm>
+            <a:off x="2645749" y="6038415"/>
+            <a:ext cx="3523846" cy="276999"/>
+          </a:xfrm>
+          <a:prstGeom prst="rect">
+            <a:avLst/>
+          </a:prstGeom>
+          <a:noFill/>
+        </p:spPr>
+        <p:txBody>
+          <a:bodyPr wrap="none" rtlCol="0">
+            <a:spAutoFit/>
+          </a:bodyPr>
+          <a:lstStyle/>
+          <a:p>
+            <a:r>
+              <a:rPr lang="en-US" sz="1200" dirty="0"/>
+              <a:t>https://</a:t>
+            </a:r>
+            <a:r>
+              <a:rPr lang="en-US" sz="1200" dirty="0" err="1"/>
+              <a:t>www.youtube.com</a:t>
+            </a:r>
+            <a:r>
+              <a:rPr lang="en-US" sz="1200" dirty="0"/>
+              <a:t>/</a:t>
+            </a:r>
+            <a:r>
+              <a:rPr lang="en-US" sz="1200" dirty="0" err="1"/>
+              <a:t>watch?v</a:t>
+            </a:r>
+            <a:r>
+              <a:rPr lang="en-US" sz="1200" dirty="0"/>
+              <a:t>=6v148z4ISIM</a:t>
+            </a:r>
+          </a:p>
+        </p:txBody>
+      </p:sp>
     </p:spTree>
     <p:extLst>
       <p:ext uri="{BB962C8B-B14F-4D97-AF65-F5344CB8AC3E}">
@@ -8221,6 +8216,304 @@
           <a:lstStyle/>
           <a:p>
             <a:r>
+              <a:rPr lang="en-US" sz="3500" dirty="0" smtClean="0"/>
+              <a:t>What is Non-Response Bias?</a:t>
+            </a:r>
+            <a:endParaRPr lang="en-US" sz="3500" dirty="0"/>
+          </a:p>
+        </p:txBody>
+      </p:sp>
+      <p:sp>
+        <p:nvSpPr>
+          <p:cNvPr id="3" name="Content Placeholder 2"/>
+          <p:cNvSpPr>
+            <a:spLocks noGrp="1"/>
+          </p:cNvSpPr>
+          <p:nvPr>
+            <p:ph idx="1"/>
+          </p:nvPr>
+        </p:nvSpPr>
+        <p:spPr>
+          <a:xfrm>
+            <a:off x="900113" y="2133601"/>
+            <a:ext cx="6894148" cy="1981787"/>
+          </a:xfrm>
+        </p:spPr>
+        <p:txBody>
+          <a:bodyPr>
+            <a:normAutofit/>
+          </a:bodyPr>
+          <a:lstStyle/>
+          <a:p>
+            <a:r>
+              <a:rPr lang="en-US" dirty="0"/>
+              <a:t>E</a:t>
+            </a:r>
+            <a:r>
+              <a:rPr lang="en-US" dirty="0" smtClean="0"/>
+              <a:t>rror due particular population </a:t>
+            </a:r>
+            <a:r>
+              <a:rPr lang="en-US" dirty="0" smtClean="0">
+                <a:solidFill>
+                  <a:srgbClr val="FF0000"/>
+                </a:solidFill>
+              </a:rPr>
+              <a:t>not responding </a:t>
+            </a:r>
+            <a:r>
+              <a:rPr lang="en-US" dirty="0" smtClean="0"/>
+              <a:t>to poll</a:t>
+            </a:r>
+          </a:p>
+        </p:txBody>
+      </p:sp>
+      <p:sp>
+        <p:nvSpPr>
+          <p:cNvPr id="4" name="Rectangle 3"/>
+          <p:cNvSpPr/>
+          <p:nvPr/>
+        </p:nvSpPr>
+        <p:spPr>
+          <a:xfrm>
+            <a:off x="1792127" y="3519973"/>
+            <a:ext cx="4572000" cy="1477328"/>
+          </a:xfrm>
+          <a:prstGeom prst="rect">
+            <a:avLst/>
+          </a:prstGeom>
+        </p:spPr>
+        <p:txBody>
+          <a:bodyPr>
+            <a:spAutoFit/>
+          </a:bodyPr>
+          <a:lstStyle/>
+          <a:p>
+            <a:r>
+              <a:rPr lang="en-US" dirty="0"/>
+              <a:t>total survey error = coverage error + nonresponse error + measurement error</a:t>
+            </a:r>
+          </a:p>
+          <a:p>
+            <a:r>
+              <a:rPr lang="en-US" dirty="0"/>
+              <a:t>+ processing error + sampling </a:t>
+            </a:r>
+            <a:r>
+              <a:rPr lang="en-US" dirty="0" smtClean="0"/>
+              <a:t>error</a:t>
+            </a:r>
+          </a:p>
+          <a:p>
+            <a:endParaRPr lang="en-US" dirty="0" smtClean="0"/>
+          </a:p>
+          <a:p>
+            <a:r>
+              <a:rPr lang="en-US" dirty="0"/>
+              <a:t>Andersen et al., </a:t>
+            </a:r>
+            <a:r>
+              <a:rPr lang="en-US" dirty="0" smtClean="0"/>
+              <a:t>1979</a:t>
+            </a:r>
+            <a:endParaRPr lang="en-US" dirty="0"/>
+          </a:p>
+        </p:txBody>
+      </p:sp>
+    </p:spTree>
+    <p:extLst>
+      <p:ext uri="{BB962C8B-B14F-4D97-AF65-F5344CB8AC3E}">
+        <p14:creationId xmlns:p14="http://schemas.microsoft.com/office/powerpoint/2010/main" val="1277114888"/>
+      </p:ext>
+    </p:extLst>
+  </p:cSld>
+  <p:clrMapOvr>
+    <a:masterClrMapping/>
+  </p:clrMapOvr>
+  <p:timing>
+    <p:tnLst>
+      <p:par>
+        <p:cTn xmlns:p14="http://schemas.microsoft.com/office/powerpoint/2010/main" id="1" dur="indefinite" restart="never" nodeType="tmRoot"/>
+      </p:par>
+    </p:tnLst>
+  </p:timing>
+</p:sld>
+</file>
+
+<file path=ppt/slides/slide5.xml><?xml version="1.0" encoding="utf-8"?>
+<p:sld xmlns:a="http://schemas.openxmlformats.org/drawingml/2006/main" xmlns:r="http://schemas.openxmlformats.org/officeDocument/2006/relationships" xmlns:p="http://schemas.openxmlformats.org/presentationml/2006/main">
+  <p:cSld>
+    <p:spTree>
+      <p:nvGrpSpPr>
+        <p:cNvPr id="1" name=""/>
+        <p:cNvGrpSpPr/>
+        <p:nvPr/>
+      </p:nvGrpSpPr>
+      <p:grpSpPr>
+        <a:xfrm>
+          <a:off x="0" y="0"/>
+          <a:ext cx="0" cy="0"/>
+          <a:chOff x="0" y="0"/>
+          <a:chExt cx="0" cy="0"/>
+        </a:xfrm>
+      </p:grpSpPr>
+      <p:sp>
+        <p:nvSpPr>
+          <p:cNvPr id="2" name="Title 1"/>
+          <p:cNvSpPr>
+            <a:spLocks noGrp="1"/>
+          </p:cNvSpPr>
+          <p:nvPr>
+            <p:ph type="title"/>
+          </p:nvPr>
+        </p:nvSpPr>
+        <p:spPr/>
+        <p:txBody>
+          <a:bodyPr>
+            <a:normAutofit/>
+          </a:bodyPr>
+          <a:lstStyle/>
+          <a:p>
+            <a:r>
+              <a:rPr lang="en-US" sz="3500" dirty="0" smtClean="0"/>
+              <a:t>Identify and adjust for (unit) nonresponse bias</a:t>
+            </a:r>
+            <a:endParaRPr lang="en-US" sz="3500" dirty="0"/>
+          </a:p>
+        </p:txBody>
+      </p:sp>
+      <p:sp>
+        <p:nvSpPr>
+          <p:cNvPr id="3" name="Content Placeholder 2"/>
+          <p:cNvSpPr>
+            <a:spLocks noGrp="1"/>
+          </p:cNvSpPr>
+          <p:nvPr>
+            <p:ph idx="1"/>
+          </p:nvPr>
+        </p:nvSpPr>
+        <p:spPr/>
+        <p:txBody>
+          <a:bodyPr/>
+          <a:lstStyle/>
+          <a:p>
+            <a:r>
+              <a:rPr lang="en-US" dirty="0" smtClean="0"/>
+              <a:t>Identify:</a:t>
+            </a:r>
+          </a:p>
+          <a:p>
+            <a:pPr lvl="1"/>
+            <a:r>
+              <a:rPr lang="en-US" dirty="0" smtClean="0"/>
+              <a:t>Compare initial and late response</a:t>
+            </a:r>
+          </a:p>
+          <a:p>
+            <a:pPr lvl="1"/>
+            <a:r>
+              <a:rPr lang="en-US" dirty="0" smtClean="0">
+                <a:solidFill>
+                  <a:srgbClr val="FF0000"/>
+                </a:solidFill>
+              </a:rPr>
+              <a:t>Compare survey results to known population parameter</a:t>
+            </a:r>
+          </a:p>
+          <a:p>
+            <a:pPr lvl="1"/>
+            <a:r>
+              <a:rPr lang="en-US" dirty="0" smtClean="0"/>
+              <a:t>Using known data	base variable to identify bias</a:t>
+            </a:r>
+          </a:p>
+          <a:p>
+            <a:pPr marL="350838" lvl="1" indent="0">
+              <a:buNone/>
+            </a:pPr>
+            <a:endParaRPr lang="en-US" dirty="0"/>
+          </a:p>
+          <a:p>
+            <a:r>
+              <a:rPr lang="en-US" dirty="0" smtClean="0"/>
+              <a:t>Adjust:</a:t>
+            </a:r>
+          </a:p>
+          <a:p>
+            <a:pPr lvl="1"/>
+            <a:r>
+              <a:rPr lang="en-US" dirty="0" smtClean="0">
+                <a:solidFill>
+                  <a:srgbClr val="FF0000"/>
+                </a:solidFill>
+              </a:rPr>
+              <a:t>Calibration weighting adjustments</a:t>
+            </a:r>
+          </a:p>
+          <a:p>
+            <a:pPr lvl="1"/>
+            <a:r>
+              <a:rPr lang="en-US" dirty="0" smtClean="0"/>
+              <a:t>Propensity model</a:t>
+            </a:r>
+            <a:endParaRPr lang="en-US" dirty="0"/>
+          </a:p>
+          <a:p>
+            <a:pPr marL="350838" lvl="1" indent="0">
+              <a:buNone/>
+            </a:pPr>
+            <a:endParaRPr lang="en-US" dirty="0"/>
+          </a:p>
+        </p:txBody>
+      </p:sp>
+    </p:spTree>
+    <p:extLst>
+      <p:ext uri="{BB962C8B-B14F-4D97-AF65-F5344CB8AC3E}">
+        <p14:creationId xmlns:p14="http://schemas.microsoft.com/office/powerpoint/2010/main" val="291710496"/>
+      </p:ext>
+    </p:extLst>
+  </p:cSld>
+  <p:clrMapOvr>
+    <a:masterClrMapping/>
+  </p:clrMapOvr>
+</p:sld>
+</file>
+
+<file path=ppt/slides/slide6.xml><?xml version="1.0" encoding="utf-8"?>
+<p:sld xmlns:a="http://schemas.openxmlformats.org/drawingml/2006/main" xmlns:r="http://schemas.openxmlformats.org/officeDocument/2006/relationships" xmlns:p="http://schemas.openxmlformats.org/presentationml/2006/main">
+  <p:cSld>
+    <p:spTree>
+      <p:nvGrpSpPr>
+        <p:cNvPr id="1" name=""/>
+        <p:cNvGrpSpPr/>
+        <p:nvPr/>
+      </p:nvGrpSpPr>
+      <p:grpSpPr>
+        <a:xfrm>
+          <a:off x="0" y="0"/>
+          <a:ext cx="0" cy="0"/>
+          <a:chOff x="0" y="0"/>
+          <a:chExt cx="0" cy="0"/>
+        </a:xfrm>
+      </p:grpSpPr>
+      <p:sp>
+        <p:nvSpPr>
+          <p:cNvPr id="2" name="Title 1"/>
+          <p:cNvSpPr>
+            <a:spLocks noGrp="1"/>
+          </p:cNvSpPr>
+          <p:nvPr>
+            <p:ph type="title"/>
+          </p:nvPr>
+        </p:nvSpPr>
+        <p:spPr/>
+        <p:txBody>
+          <a:bodyPr>
+            <a:normAutofit/>
+          </a:bodyPr>
+          <a:lstStyle/>
+          <a:p>
+            <a:r>
               <a:rPr lang="en-US" sz="2800" dirty="0" smtClean="0"/>
               <a:t>4 approaches to mitigate nonresponse bias</a:t>
             </a:r>
@@ -8258,10 +8551,17 @@
   <p:clrMapOvr>
     <a:masterClrMapping/>
   </p:clrMapOvr>
+  <p:timing>
+    <p:tnLst>
+      <p:par>
+        <p:cTn xmlns:p14="http://schemas.microsoft.com/office/powerpoint/2010/main" id="1" dur="indefinite" restart="never" nodeType="tmRoot"/>
+      </p:par>
+    </p:tnLst>
+  </p:timing>
 </p:sld>
 </file>
 
-<file path=ppt/slides/slide5.xml><?xml version="1.0" encoding="utf-8"?>
+<file path=ppt/slides/slide7.xml><?xml version="1.0" encoding="utf-8"?>
 <p:sld xmlns:a="http://schemas.openxmlformats.org/drawingml/2006/main" xmlns:r="http://schemas.openxmlformats.org/officeDocument/2006/relationships" xmlns:p="http://schemas.openxmlformats.org/presentationml/2006/main" show="0">
   <p:cSld>
     <p:spTree>
@@ -8497,7 +8797,7 @@
 </p:sld>
 </file>
 
-<file path=ppt/slides/slide6.xml><?xml version="1.0" encoding="utf-8"?>
+<file path=ppt/slides/slide8.xml><?xml version="1.0" encoding="utf-8"?>
 <p:sld xmlns:a="http://schemas.openxmlformats.org/drawingml/2006/main" xmlns:r="http://schemas.openxmlformats.org/officeDocument/2006/relationships" xmlns:p="http://schemas.openxmlformats.org/presentationml/2006/main" show="0">
   <p:cSld>
     <p:spTree>
@@ -8731,7 +9031,7 @@
 </p:sld>
 </file>
 
-<file path=ppt/slides/slide7.xml><?xml version="1.0" encoding="utf-8"?>
+<file path=ppt/slides/slide9.xml><?xml version="1.0" encoding="utf-8"?>
 <p:sld xmlns:a="http://schemas.openxmlformats.org/drawingml/2006/main" xmlns:r="http://schemas.openxmlformats.org/officeDocument/2006/relationships" xmlns:p="http://schemas.openxmlformats.org/presentationml/2006/main" show="0">
   <p:cSld>
     <p:spTree>

</xml_diff>